<commit_message>
update opening slides for 3-15
- add ECHONET
- add break (need to fix that as well on other days...)
</commit_message>
<xml_diff>
--- a/PRESENTATIONS/2021-03-online-f2f/2021-03-15-WoT-F2F-Opening-McCool.pptx
+++ b/PRESENTATIONS/2021-03-online-f2f/2021-03-15-WoT-F2F-Opening-McCool.pptx
@@ -211,7 +211,7 @@
           <a:p>
             <a:fld id="{8389B5DD-0274-BF45-B4C5-62E173E8F634}" type="datetimeFigureOut">
               <a:rPr lang="en-US" smtClean="0"/>
-              <a:t>3/9/21</a:t>
+              <a:t>3/15/21</a:t>
             </a:fld>
             <a:endParaRPr lang="en-US"/>
           </a:p>
@@ -827,7 +827,7 @@
           <a:p>
             <a:fld id="{2F93E591-CC8D-C74E-8EED-098A7FB5E64D}" type="datetime1">
               <a:rPr lang="en-CA" smtClean="0"/>
-              <a:t>2021-03-09</a:t>
+              <a:t>2021-03-15</a:t>
             </a:fld>
             <a:endParaRPr lang="en-US"/>
           </a:p>
@@ -1095,7 +1095,7 @@
           <a:p>
             <a:fld id="{2E1BC118-574D-594E-ABEA-A7C82666C9AB}" type="datetime1">
               <a:rPr lang="en-CA" smtClean="0"/>
-              <a:t>2021-03-09</a:t>
+              <a:t>2021-03-15</a:t>
             </a:fld>
             <a:endParaRPr lang="en-US"/>
           </a:p>
@@ -1461,7 +1461,7 @@
           <a:p>
             <a:fld id="{B929AB1E-7FD9-0A40-B7C0-508CCACB3E9A}" type="datetime1">
               <a:rPr lang="en-CA" smtClean="0"/>
-              <a:t>2021-03-09</a:t>
+              <a:t>2021-03-15</a:t>
             </a:fld>
             <a:endParaRPr lang="en-US"/>
           </a:p>
@@ -1693,7 +1693,7 @@
           <a:p>
             <a:fld id="{5AE8723F-57EA-4C47-97B9-92AFDEEF85DC}" type="datetime1">
               <a:rPr lang="en-CA" smtClean="0"/>
-              <a:t>2021-03-09</a:t>
+              <a:t>2021-03-15</a:t>
             </a:fld>
             <a:endParaRPr lang="en-US"/>
           </a:p>
@@ -2023,7 +2023,7 @@
           <a:p>
             <a:fld id="{B2B00E5D-EC04-AA49-8D52-0FCB6E08F63D}" type="datetime1">
               <a:rPr lang="en-CA" smtClean="0"/>
-              <a:t>2021-03-09</a:t>
+              <a:t>2021-03-15</a:t>
             </a:fld>
             <a:endParaRPr lang="en-US"/>
           </a:p>
@@ -2496,7 +2496,7 @@
           <a:p>
             <a:fld id="{FF90905C-10FF-8047-AA7E-6DC7E8B6AF51}" type="datetime1">
               <a:rPr lang="en-CA" smtClean="0"/>
-              <a:t>2021-03-09</a:t>
+              <a:t>2021-03-15</a:t>
             </a:fld>
             <a:endParaRPr lang="en-US"/>
           </a:p>
@@ -2702,7 +2702,7 @@
           <a:p>
             <a:fld id="{D1CE86E2-4400-D342-BEEC-F9C1ADF6F9F7}" type="datetime1">
               <a:rPr lang="en-CA" smtClean="0"/>
-              <a:t>2021-03-09</a:t>
+              <a:t>2021-03-15</a:t>
             </a:fld>
             <a:endParaRPr lang="en-US"/>
           </a:p>
@@ -2872,7 +2872,7 @@
           <a:p>
             <a:fld id="{74358A08-7221-7F45-8378-69D5559861DD}" type="datetime1">
               <a:rPr lang="en-CA" smtClean="0"/>
-              <a:t>2021-03-09</a:t>
+              <a:t>2021-03-15</a:t>
             </a:fld>
             <a:endParaRPr lang="en-US"/>
           </a:p>
@@ -3244,7 +3244,7 @@
           <a:p>
             <a:fld id="{08C20FDB-303D-8A4E-83B7-226DD88B97BD}" type="datetime1">
               <a:rPr lang="en-CA" smtClean="0"/>
-              <a:t>2021-03-09</a:t>
+              <a:t>2021-03-15</a:t>
             </a:fld>
             <a:endParaRPr lang="en-US"/>
           </a:p>
@@ -3596,7 +3596,7 @@
           <a:p>
             <a:fld id="{0A9EBA37-9D18-D34A-A88D-1B00AA06E95C}" type="datetime1">
               <a:rPr lang="en-CA" smtClean="0"/>
-              <a:t>2021-03-09</a:t>
+              <a:t>2021-03-15</a:t>
             </a:fld>
             <a:endParaRPr lang="en-US"/>
           </a:p>
@@ -3936,7 +3936,7 @@
             <a:fld id="{B73A2E78-F38A-E046-ACDB-668F070D1EF6}" type="datetime1">
               <a:rPr lang="en-CA" smtClean="0"/>
               <a:pPr/>
-              <a:t>2021-03-09</a:t>
+              <a:t>2021-03-15</a:t>
             </a:fld>
             <a:endParaRPr lang="en-US" dirty="0"/>
           </a:p>
@@ -4557,7 +4557,7 @@
           <a:p>
             <a:fld id="{BF92DA42-2970-1B4D-9C1F-77F249CD7467}" type="datetime1">
               <a:rPr lang="en-CA" smtClean="0"/>
-              <a:t>2021-03-09</a:t>
+              <a:t>2021-03-15</a:t>
             </a:fld>
             <a:endParaRPr lang="en-US" dirty="0"/>
           </a:p>
@@ -4821,14 +4821,21 @@
             <a:pPr lvl="1"/>
             <a:r>
               <a:rPr lang="en-CA" dirty="0"/>
-              <a:t>Architecture (1h)</a:t>
+              <a:t>Architecture </a:t>
             </a:r>
           </a:p>
           <a:p>
             <a:pPr lvl="1"/>
             <a:r>
               <a:rPr lang="en-CA" dirty="0"/>
-              <a:t>Profiles (2h)</a:t>
+              <a:t>Profiles </a:t>
+            </a:r>
+          </a:p>
+          <a:p>
+            <a:pPr lvl="1"/>
+            <a:r>
+              <a:rPr lang="en-CA" dirty="0"/>
+              <a:t>ITU-T</a:t>
             </a:r>
           </a:p>
           <a:p>
@@ -4996,21 +5003,11 @@
           <a:p>
             <a:r>
               <a:rPr lang="en-CA" b="1" dirty="0"/>
-              <a:t>Joint Sessions (2h50m)</a:t>
-            </a:r>
-            <a:r>
-              <a:rPr lang="en-CA" dirty="0"/>
-              <a:t>[</a:t>
-            </a:r>
-            <a:r>
-              <a:rPr lang="en-CA" dirty="0">
-                <a:hlinkClick r:id="rId2" tooltip="Edit section: Joint Sessions (2h50m)"/>
-              </a:rPr>
-              <a:t>edit</a:t>
-            </a:r>
-            <a:r>
-              <a:rPr lang="en-CA" dirty="0"/>
-              <a:t>]</a:t>
+              <a:t>Joint Sessions I (1h10m) - </a:t>
+            </a:r>
+            <a:r>
+              <a:rPr lang="en-CA" b="1" dirty="0" err="1"/>
+              <a:t>Kaz</a:t>
             </a:r>
             <a:endParaRPr lang="en-CA" b="1" dirty="0"/>
           </a:p>
@@ -5029,6 +5026,23 @@
             </a:r>
           </a:p>
           <a:p>
+            <a:r>
+              <a:rPr lang="en-CA" b="1" dirty="0"/>
+              <a:t>Break (10m)</a:t>
+            </a:r>
+          </a:p>
+          <a:p>
+            <a:r>
+              <a:rPr lang="en-CA" b="1" dirty="0"/>
+              <a:t>Joint Sessions II (1h30m) - </a:t>
+            </a:r>
+            <a:r>
+              <a:rPr lang="en-CA" b="1" dirty="0" err="1"/>
+              <a:t>Ege</a:t>
+            </a:r>
+            <a:endParaRPr lang="en-CA" dirty="0"/>
+          </a:p>
+          <a:p>
             <a:pPr lvl="1"/>
             <a:r>
               <a:rPr lang="en-CA" dirty="0" err="1"/>
@@ -5036,14 +5050,21 @@
             </a:r>
             <a:r>
               <a:rPr lang="en-CA" dirty="0"/>
-              <a:t> - 40m (20m update, 20m discussion)</a:t>
+              <a:t> - 30m (20m update, 10m discussion)</a:t>
             </a:r>
           </a:p>
           <a:p>
             <a:pPr lvl="1"/>
             <a:r>
               <a:rPr lang="en-CA" dirty="0"/>
-              <a:t>T2TRG - 40m (20m update, 20m discussion)</a:t>
+              <a:t>T2TRG - 30m (20m update, 10m discussion)</a:t>
+            </a:r>
+          </a:p>
+          <a:p>
+            <a:pPr lvl="1"/>
+            <a:r>
+              <a:rPr lang="en-CA" dirty="0"/>
+              <a:t>ECHONET – 30m (20m update, 10m discussion)</a:t>
             </a:r>
           </a:p>
           <a:p>
@@ -5141,7 +5162,7 @@
           <a:p>
             <a:fld id="{B929AB1E-7FD9-0A40-B7C0-508CCACB3E9A}" type="datetime1">
               <a:rPr lang="en-CA" smtClean="0"/>
-              <a:t>2021-03-09</a:t>
+              <a:t>2021-03-15</a:t>
             </a:fld>
             <a:endParaRPr lang="en-US"/>
           </a:p>
@@ -5359,7 +5380,7 @@
           <a:p>
             <a:fld id="{BF92DA42-2970-1B4D-9C1F-77F249CD7467}" type="datetime1">
               <a:rPr lang="en-CA" smtClean="0"/>
-              <a:t>2021-03-09</a:t>
+              <a:t>2021-03-15</a:t>
             </a:fld>
             <a:endParaRPr lang="en-US" dirty="0"/>
           </a:p>

</xml_diff>

<commit_message>
update F2F agenda slides
various bugfixes: insert breaks in to the 25th agenda, add ITU-T to other slides, etc.
</commit_message>
<xml_diff>
--- a/PRESENTATIONS/2021-03-online-f2f/2021-03-15-WoT-F2F-Opening-McCool.pptx
+++ b/PRESENTATIONS/2021-03-online-f2f/2021-03-15-WoT-F2F-Opening-McCool.pptx
@@ -211,7 +211,7 @@
           <a:p>
             <a:fld id="{8389B5DD-0274-BF45-B4C5-62E173E8F634}" type="datetimeFigureOut">
               <a:rPr lang="en-US" smtClean="0"/>
-              <a:t>3/15/21</a:t>
+              <a:t>3/24/21</a:t>
             </a:fld>
             <a:endParaRPr lang="en-US"/>
           </a:p>
@@ -827,7 +827,7 @@
           <a:p>
             <a:fld id="{2F93E591-CC8D-C74E-8EED-098A7FB5E64D}" type="datetime1">
               <a:rPr lang="en-CA" smtClean="0"/>
-              <a:t>2021-03-15</a:t>
+              <a:t>2021-03-24</a:t>
             </a:fld>
             <a:endParaRPr lang="en-US"/>
           </a:p>
@@ -1095,7 +1095,7 @@
           <a:p>
             <a:fld id="{2E1BC118-574D-594E-ABEA-A7C82666C9AB}" type="datetime1">
               <a:rPr lang="en-CA" smtClean="0"/>
-              <a:t>2021-03-15</a:t>
+              <a:t>2021-03-24</a:t>
             </a:fld>
             <a:endParaRPr lang="en-US"/>
           </a:p>
@@ -1461,7 +1461,7 @@
           <a:p>
             <a:fld id="{B929AB1E-7FD9-0A40-B7C0-508CCACB3E9A}" type="datetime1">
               <a:rPr lang="en-CA" smtClean="0"/>
-              <a:t>2021-03-15</a:t>
+              <a:t>2021-03-24</a:t>
             </a:fld>
             <a:endParaRPr lang="en-US"/>
           </a:p>
@@ -1693,7 +1693,7 @@
           <a:p>
             <a:fld id="{5AE8723F-57EA-4C47-97B9-92AFDEEF85DC}" type="datetime1">
               <a:rPr lang="en-CA" smtClean="0"/>
-              <a:t>2021-03-15</a:t>
+              <a:t>2021-03-24</a:t>
             </a:fld>
             <a:endParaRPr lang="en-US"/>
           </a:p>
@@ -2023,7 +2023,7 @@
           <a:p>
             <a:fld id="{B2B00E5D-EC04-AA49-8D52-0FCB6E08F63D}" type="datetime1">
               <a:rPr lang="en-CA" smtClean="0"/>
-              <a:t>2021-03-15</a:t>
+              <a:t>2021-03-24</a:t>
             </a:fld>
             <a:endParaRPr lang="en-US"/>
           </a:p>
@@ -2496,7 +2496,7 @@
           <a:p>
             <a:fld id="{FF90905C-10FF-8047-AA7E-6DC7E8B6AF51}" type="datetime1">
               <a:rPr lang="en-CA" smtClean="0"/>
-              <a:t>2021-03-15</a:t>
+              <a:t>2021-03-24</a:t>
             </a:fld>
             <a:endParaRPr lang="en-US"/>
           </a:p>
@@ -2702,7 +2702,7 @@
           <a:p>
             <a:fld id="{D1CE86E2-4400-D342-BEEC-F9C1ADF6F9F7}" type="datetime1">
               <a:rPr lang="en-CA" smtClean="0"/>
-              <a:t>2021-03-15</a:t>
+              <a:t>2021-03-24</a:t>
             </a:fld>
             <a:endParaRPr lang="en-US"/>
           </a:p>
@@ -2872,7 +2872,7 @@
           <a:p>
             <a:fld id="{74358A08-7221-7F45-8378-69D5559861DD}" type="datetime1">
               <a:rPr lang="en-CA" smtClean="0"/>
-              <a:t>2021-03-15</a:t>
+              <a:t>2021-03-24</a:t>
             </a:fld>
             <a:endParaRPr lang="en-US"/>
           </a:p>
@@ -3244,7 +3244,7 @@
           <a:p>
             <a:fld id="{08C20FDB-303D-8A4E-83B7-226DD88B97BD}" type="datetime1">
               <a:rPr lang="en-CA" smtClean="0"/>
-              <a:t>2021-03-15</a:t>
+              <a:t>2021-03-24</a:t>
             </a:fld>
             <a:endParaRPr lang="en-US"/>
           </a:p>
@@ -3596,7 +3596,7 @@
           <a:p>
             <a:fld id="{0A9EBA37-9D18-D34A-A88D-1B00AA06E95C}" type="datetime1">
               <a:rPr lang="en-CA" smtClean="0"/>
-              <a:t>2021-03-15</a:t>
+              <a:t>2021-03-24</a:t>
             </a:fld>
             <a:endParaRPr lang="en-US"/>
           </a:p>
@@ -3936,7 +3936,7 @@
             <a:fld id="{B73A2E78-F38A-E046-ACDB-668F070D1EF6}" type="datetime1">
               <a:rPr lang="en-CA" smtClean="0"/>
               <a:pPr/>
-              <a:t>2021-03-15</a:t>
+              <a:t>2021-03-24</a:t>
             </a:fld>
             <a:endParaRPr lang="en-US" dirty="0"/>
           </a:p>
@@ -4557,7 +4557,7 @@
           <a:p>
             <a:fld id="{BF92DA42-2970-1B4D-9C1F-77F249CD7467}" type="datetime1">
               <a:rPr lang="en-CA" smtClean="0"/>
-              <a:t>2021-03-15</a:t>
+              <a:t>2021-03-24</a:t>
             </a:fld>
             <a:endParaRPr lang="en-US" dirty="0"/>
           </a:p>
@@ -4821,6 +4821,13 @@
             <a:pPr lvl="1"/>
             <a:r>
               <a:rPr lang="en-CA" dirty="0"/>
+              <a:t>ITU-T</a:t>
+            </a:r>
+          </a:p>
+          <a:p>
+            <a:pPr lvl="1"/>
+            <a:r>
+              <a:rPr lang="en-CA" dirty="0"/>
               <a:t>Architecture </a:t>
             </a:r>
           </a:p>
@@ -4829,13 +4836,6 @@
             <a:r>
               <a:rPr lang="en-CA" dirty="0"/>
               <a:t>Profiles </a:t>
-            </a:r>
-          </a:p>
-          <a:p>
-            <a:pPr lvl="1"/>
-            <a:r>
-              <a:rPr lang="en-CA" dirty="0"/>
-              <a:t>ITU-T</a:t>
             </a:r>
           </a:p>
           <a:p>
@@ -5162,7 +5162,7 @@
           <a:p>
             <a:fld id="{B929AB1E-7FD9-0A40-B7C0-508CCACB3E9A}" type="datetime1">
               <a:rPr lang="en-CA" smtClean="0"/>
-              <a:t>2021-03-15</a:t>
+              <a:t>2021-03-24</a:t>
             </a:fld>
             <a:endParaRPr lang="en-US"/>
           </a:p>
@@ -5380,7 +5380,7 @@
           <a:p>
             <a:fld id="{BF92DA42-2970-1B4D-9C1F-77F249CD7467}" type="datetime1">
               <a:rPr lang="en-CA" smtClean="0"/>
-              <a:t>2021-03-15</a:t>
+              <a:t>2021-03-24</a:t>
             </a:fld>
             <a:endParaRPr lang="en-US" dirty="0"/>
           </a:p>

</xml_diff>